<commit_message>
I HAVE TO TYPING STH??
</commit_message>
<xml_diff>
--- a/The educator.pptx
+++ b/The educator.pptx
@@ -15,16 +15,14 @@
     <p:sldId id="271" r:id="rId9"/>
     <p:sldId id="272" r:id="rId10"/>
     <p:sldId id="273" r:id="rId11"/>
-    <p:sldId id="274" r:id="rId12"/>
-    <p:sldId id="261" r:id="rId13"/>
-    <p:sldId id="262" r:id="rId14"/>
-    <p:sldId id="264" r:id="rId15"/>
-    <p:sldId id="266" r:id="rId16"/>
-    <p:sldId id="265" r:id="rId17"/>
-    <p:sldId id="267" r:id="rId18"/>
-    <p:sldId id="268" r:id="rId19"/>
-    <p:sldId id="269" r:id="rId20"/>
-    <p:sldId id="275" r:id="rId21"/>
+    <p:sldId id="261" r:id="rId12"/>
+    <p:sldId id="262" r:id="rId13"/>
+    <p:sldId id="264" r:id="rId14"/>
+    <p:sldId id="266" r:id="rId15"/>
+    <p:sldId id="265" r:id="rId16"/>
+    <p:sldId id="267" r:id="rId17"/>
+    <p:sldId id="268" r:id="rId18"/>
+    <p:sldId id="275" r:id="rId19"/>
   </p:sldIdLst>
   <p:sldSz cx="12192000" cy="6858000"/>
   <p:notesSz cx="6858000" cy="9144000"/>
@@ -3627,99 +3625,6 @@
           <a:bodyPr/>
           <a:lstStyle/>
           <a:p>
-            <a:r>
-              <a:rPr lang="en-US" smtClean="0"/>
-              <a:t>Backfeed</a:t>
-            </a:r>
-            <a:endParaRPr lang="en-US" dirty="0"/>
-          </a:p>
-        </p:txBody>
-      </p:sp>
-      <p:sp>
-        <p:nvSpPr>
-          <p:cNvPr id="3" name="Content Placeholder 2"/>
-          <p:cNvSpPr>
-            <a:spLocks noGrp="1"/>
-          </p:cNvSpPr>
-          <p:nvPr>
-            <p:ph idx="1"/>
-          </p:nvPr>
-        </p:nvSpPr>
-        <p:spPr/>
-        <p:txBody>
-          <a:bodyPr/>
-          <a:lstStyle/>
-          <a:p>
-            <a:r>
-              <a:rPr lang="en-US" dirty="0" smtClean="0"/>
-              <a:t>“I mean, it wasn’t bad. There could be improvements for every everything. Time, points, no unlimited guesses. Maybe instead of waiting for the thing to buzz, you can like … you can let it be wrong. Give the right answer and give the next question. you know what I am saying?” – Alex Marker</a:t>
-            </a:r>
-          </a:p>
-          <a:p>
-            <a:endParaRPr lang="en-US" dirty="0"/>
-          </a:p>
-          <a:p>
-            <a:r>
-              <a:rPr lang="en-US" dirty="0" smtClean="0"/>
-              <a:t>“It’s good. It’s fun. It’s educational. You guys have should add points.” –</a:t>
-            </a:r>
-            <a:r>
-              <a:rPr lang="en-US" dirty="0" err="1" smtClean="0"/>
-              <a:t>Jhihyang</a:t>
-            </a:r>
-            <a:r>
-              <a:rPr lang="en-US" dirty="0" smtClean="0"/>
-              <a:t> Wu</a:t>
-            </a:r>
-            <a:endParaRPr lang="en-US" dirty="0"/>
-          </a:p>
-        </p:txBody>
-      </p:sp>
-    </p:spTree>
-    <p:extLst>
-      <p:ext uri="{BB962C8B-B14F-4D97-AF65-F5344CB8AC3E}">
-        <p14:creationId xmlns:p14="http://schemas.microsoft.com/office/powerpoint/2010/main" val="2934760547"/>
-      </p:ext>
-    </p:extLst>
-  </p:cSld>
-  <p:clrMapOvr>
-    <a:masterClrMapping/>
-  </p:clrMapOvr>
-</p:sld>
-</file>
-
-<file path=ppt/slides/slide12.xml><?xml version="1.0" encoding="utf-8"?>
-<p:sld xmlns:a="http://schemas.openxmlformats.org/drawingml/2006/main" xmlns:r="http://schemas.openxmlformats.org/officeDocument/2006/relationships" xmlns:p="http://schemas.openxmlformats.org/presentationml/2006/main">
-  <p:cSld>
-    <p:spTree>
-      <p:nvGrpSpPr>
-        <p:cNvPr id="1" name=""/>
-        <p:cNvGrpSpPr/>
-        <p:nvPr/>
-      </p:nvGrpSpPr>
-      <p:grpSpPr>
-        <a:xfrm>
-          <a:off x="0" y="0"/>
-          <a:ext cx="0" cy="0"/>
-          <a:chOff x="0" y="0"/>
-          <a:chExt cx="0" cy="0"/>
-        </a:xfrm>
-      </p:grpSpPr>
-      <p:sp>
-        <p:nvSpPr>
-          <p:cNvPr id="2" name="Title 1"/>
-          <p:cNvSpPr>
-            <a:spLocks noGrp="1"/>
-          </p:cNvSpPr>
-          <p:nvPr>
-            <p:ph type="title"/>
-          </p:nvPr>
-        </p:nvSpPr>
-        <p:spPr/>
-        <p:txBody>
-          <a:bodyPr/>
-          <a:lstStyle/>
-          <a:p>
             <a:endParaRPr lang="en-US"/>
           </a:p>
         </p:txBody>
@@ -4050,7 +3955,7 @@
 </p:sld>
 </file>
 
-<file path=ppt/slides/slide13.xml><?xml version="1.0" encoding="utf-8"?>
+<file path=ppt/slides/slide12.xml><?xml version="1.0" encoding="utf-8"?>
 <p:sld xmlns:a="http://schemas.openxmlformats.org/drawingml/2006/main" xmlns:r="http://schemas.openxmlformats.org/officeDocument/2006/relationships" xmlns:p="http://schemas.openxmlformats.org/presentationml/2006/main">
   <p:cSld>
     <p:spTree>
@@ -4110,8 +4015,8 @@
         </p:blipFill>
         <p:spPr>
           <a:xfrm>
-            <a:off x="0" y="0"/>
-            <a:ext cx="10972800" cy="6858000"/>
+            <a:off x="-1" y="0"/>
+            <a:ext cx="12197955" cy="6858000"/>
           </a:xfrm>
         </p:spPr>
       </p:pic>
@@ -4123,7 +4028,7 @@
         </p:nvSpPr>
         <p:spPr>
           <a:xfrm>
-            <a:off x="5060373" y="5257800"/>
+            <a:off x="6727460" y="5925222"/>
             <a:ext cx="2421082" cy="810491"/>
           </a:xfrm>
           <a:prstGeom prst="leftArrow">
@@ -4163,7 +4068,7 @@
         </p:nvSpPr>
         <p:spPr>
           <a:xfrm>
-            <a:off x="7543799" y="5339879"/>
+            <a:off x="9180687" y="6007303"/>
             <a:ext cx="3449782" cy="646331"/>
           </a:xfrm>
           <a:prstGeom prst="rect">
@@ -4201,7 +4106,7 @@
         </p:nvSpPr>
         <p:spPr>
           <a:xfrm>
-            <a:off x="7862776" y="1629681"/>
+            <a:off x="9757063" y="963637"/>
             <a:ext cx="2473036" cy="1477328"/>
           </a:xfrm>
           <a:prstGeom prst="rect">
@@ -4221,23 +4126,7 @@
                   <a:schemeClr val="bg1"/>
                 </a:solidFill>
               </a:rPr>
-              <a:t>If you type the wrong name, it won’t do anything if you press enter. </a:t>
-            </a:r>
-            <a:r>
-              <a:rPr lang="en-US" smtClean="0">
-                <a:solidFill>
-                  <a:schemeClr val="bg1"/>
-                </a:solidFill>
-              </a:rPr>
-              <a:t>You need </a:t>
-            </a:r>
-            <a:r>
-              <a:rPr lang="en-US" dirty="0" smtClean="0">
-                <a:solidFill>
-                  <a:schemeClr val="bg1"/>
-                </a:solidFill>
-              </a:rPr>
-              <a:t>to re-type it</a:t>
+              <a:t>If you type the wrong name, it won’t do anything if you press enter. You need to re-type it</a:t>
             </a:r>
             <a:endParaRPr lang="en-US" dirty="0">
               <a:solidFill>
@@ -4251,6 +4140,84 @@
     <p:extLst>
       <p:ext uri="{BB962C8B-B14F-4D97-AF65-F5344CB8AC3E}">
         <p14:creationId xmlns:p14="http://schemas.microsoft.com/office/powerpoint/2010/main" val="1277351911"/>
+      </p:ext>
+    </p:extLst>
+  </p:cSld>
+  <p:clrMapOvr>
+    <a:masterClrMapping/>
+  </p:clrMapOvr>
+</p:sld>
+</file>
+
+<file path=ppt/slides/slide13.xml><?xml version="1.0" encoding="utf-8"?>
+<p:sld xmlns:a="http://schemas.openxmlformats.org/drawingml/2006/main" xmlns:r="http://schemas.openxmlformats.org/officeDocument/2006/relationships" xmlns:p="http://schemas.openxmlformats.org/presentationml/2006/main">
+  <p:cSld>
+    <p:spTree>
+      <p:nvGrpSpPr>
+        <p:cNvPr id="1" name=""/>
+        <p:cNvGrpSpPr/>
+        <p:nvPr/>
+      </p:nvGrpSpPr>
+      <p:grpSpPr>
+        <a:xfrm>
+          <a:off x="0" y="0"/>
+          <a:ext cx="0" cy="0"/>
+          <a:chOff x="0" y="0"/>
+          <a:chExt cx="0" cy="0"/>
+        </a:xfrm>
+      </p:grpSpPr>
+      <p:sp>
+        <p:nvSpPr>
+          <p:cNvPr id="2" name="Title 1"/>
+          <p:cNvSpPr>
+            <a:spLocks noGrp="1"/>
+          </p:cNvSpPr>
+          <p:nvPr>
+            <p:ph type="title"/>
+          </p:nvPr>
+        </p:nvSpPr>
+        <p:spPr/>
+        <p:txBody>
+          <a:bodyPr/>
+          <a:lstStyle/>
+          <a:p>
+            <a:endParaRPr lang="en-US"/>
+          </a:p>
+        </p:txBody>
+      </p:sp>
+      <p:pic>
+        <p:nvPicPr>
+          <p:cNvPr id="4" name="Content Placeholder 3"/>
+          <p:cNvPicPr>
+            <a:picLocks noGrp="1" noChangeAspect="1"/>
+          </p:cNvPicPr>
+          <p:nvPr>
+            <p:ph idx="1"/>
+          </p:nvPr>
+        </p:nvPicPr>
+        <p:blipFill>
+          <a:blip r:embed="rId2">
+            <a:extLst>
+              <a:ext uri="{28A0092B-C50C-407E-A947-70E740481C1C}">
+                <a14:useLocalDpi xmlns:a14="http://schemas.microsoft.com/office/drawing/2010/main" val="0"/>
+              </a:ext>
+            </a:extLst>
+          </a:blip>
+          <a:stretch>
+            <a:fillRect/>
+          </a:stretch>
+        </p:blipFill>
+        <p:spPr>
+          <a:xfrm>
+            <a:off x="0" y="0"/>
+            <a:ext cx="12192000" cy="6854652"/>
+          </a:xfrm>
+        </p:spPr>
+      </p:pic>
+    </p:spTree>
+    <p:extLst>
+      <p:ext uri="{BB962C8B-B14F-4D97-AF65-F5344CB8AC3E}">
+        <p14:creationId xmlns:p14="http://schemas.microsoft.com/office/powerpoint/2010/main" val="2534230612"/>
       </p:ext>
     </p:extLst>
   </p:cSld>
@@ -4296,15 +4263,32 @@
           </a:p>
         </p:txBody>
       </p:sp>
+      <p:sp>
+        <p:nvSpPr>
+          <p:cNvPr id="3" name="Content Placeholder 2"/>
+          <p:cNvSpPr>
+            <a:spLocks noGrp="1"/>
+          </p:cNvSpPr>
+          <p:nvPr>
+            <p:ph idx="1"/>
+          </p:nvPr>
+        </p:nvSpPr>
+        <p:spPr/>
+        <p:txBody>
+          <a:bodyPr/>
+          <a:lstStyle/>
+          <a:p>
+            <a:endParaRPr lang="en-US"/>
+          </a:p>
+        </p:txBody>
+      </p:sp>
       <p:pic>
         <p:nvPicPr>
-          <p:cNvPr id="4" name="Content Placeholder 3"/>
+          <p:cNvPr id="4" name="Picture 3"/>
           <p:cNvPicPr>
-            <a:picLocks noGrp="1" noChangeAspect="1"/>
+            <a:picLocks noChangeAspect="1"/>
           </p:cNvPicPr>
-          <p:nvPr>
-            <p:ph idx="1"/>
-          </p:nvPr>
+          <p:nvPr/>
         </p:nvPicPr>
         <p:blipFill>
           <a:blip r:embed="rId2">
@@ -4320,15 +4304,18 @@
         </p:blipFill>
         <p:spPr>
           <a:xfrm>
-            <a:off x="592282" y="0"/>
-            <a:ext cx="10972800" cy="6858000"/>
+            <a:off x="0" y="0"/>
+            <a:ext cx="12192000" cy="6854652"/>
           </a:xfrm>
+          <a:prstGeom prst="rect">
+            <a:avLst/>
+          </a:prstGeom>
         </p:spPr>
       </p:pic>
     </p:spTree>
     <p:extLst>
       <p:ext uri="{BB962C8B-B14F-4D97-AF65-F5344CB8AC3E}">
-        <p14:creationId xmlns:p14="http://schemas.microsoft.com/office/powerpoint/2010/main" val="2534230612"/>
+        <p14:creationId xmlns:p14="http://schemas.microsoft.com/office/powerpoint/2010/main" val="969019858"/>
       </p:ext>
     </p:extLst>
   </p:cSld>
@@ -4395,7 +4382,7 @@
       </p:sp>
       <p:pic>
         <p:nvPicPr>
-          <p:cNvPr id="4" name="Picture 3"/>
+          <p:cNvPr id="5" name="Picture 4"/>
           <p:cNvPicPr>
             <a:picLocks noChangeAspect="1"/>
           </p:cNvPicPr>
@@ -4415,8 +4402,8 @@
         </p:blipFill>
         <p:spPr>
           <a:xfrm>
-            <a:off x="609600" y="0"/>
-            <a:ext cx="10972800" cy="6858000"/>
+            <a:off x="0" y="0"/>
+            <a:ext cx="12192000" cy="6854652"/>
           </a:xfrm>
           <a:prstGeom prst="rect">
             <a:avLst/>
@@ -4426,7 +4413,7 @@
     </p:spTree>
     <p:extLst>
       <p:ext uri="{BB962C8B-B14F-4D97-AF65-F5344CB8AC3E}">
-        <p14:creationId xmlns:p14="http://schemas.microsoft.com/office/powerpoint/2010/main" val="969019858"/>
+        <p14:creationId xmlns:p14="http://schemas.microsoft.com/office/powerpoint/2010/main" val="3387606384"/>
       </p:ext>
     </p:extLst>
   </p:cSld>
@@ -4474,26 +4461,45 @@
       </p:sp>
       <p:sp>
         <p:nvSpPr>
-          <p:cNvPr id="3" name="Content Placeholder 2"/>
-          <p:cNvSpPr>
-            <a:spLocks noGrp="1"/>
-          </p:cNvSpPr>
-          <p:nvPr>
-            <p:ph idx="1"/>
-          </p:nvPr>
-        </p:nvSpPr>
-        <p:spPr/>
-        <p:txBody>
-          <a:bodyPr/>
-          <a:lstStyle/>
-          <a:p>
-            <a:endParaRPr lang="en-US"/>
+          <p:cNvPr id="5" name="TextBox 4"/>
+          <p:cNvSpPr txBox="1"/>
+          <p:nvPr/>
+        </p:nvSpPr>
+        <p:spPr>
+          <a:xfrm>
+            <a:off x="3449781" y="2795154"/>
+            <a:ext cx="6691746" cy="369332"/>
+          </a:xfrm>
+          <a:prstGeom prst="rect">
+            <a:avLst/>
+          </a:prstGeom>
+          <a:noFill/>
+        </p:spPr>
+        <p:txBody>
+          <a:bodyPr wrap="square" rtlCol="0">
+            <a:spAutoFit/>
+          </a:bodyPr>
+          <a:lstStyle/>
+          <a:p>
+            <a:r>
+              <a:rPr lang="en-US" dirty="0" smtClean="0">
+                <a:solidFill>
+                  <a:schemeClr val="bg1"/>
+                </a:solidFill>
+              </a:rPr>
+              <a:t>As you type, the first letter is automatically capitalized.</a:t>
+            </a:r>
+            <a:endParaRPr lang="en-US" dirty="0">
+              <a:solidFill>
+                <a:schemeClr val="bg1"/>
+              </a:solidFill>
+            </a:endParaRPr>
           </a:p>
         </p:txBody>
       </p:sp>
       <p:pic>
         <p:nvPicPr>
-          <p:cNvPr id="5" name="Picture 4"/>
+          <p:cNvPr id="6" name="Picture 5"/>
           <p:cNvPicPr>
             <a:picLocks noChangeAspect="1"/>
           </p:cNvPicPr>
@@ -4513,18 +4519,54 @@
         </p:blipFill>
         <p:spPr>
           <a:xfrm>
-            <a:off x="609600" y="-10391"/>
-            <a:ext cx="10972800" cy="6858000"/>
+            <a:off x="0" y="0"/>
+            <a:ext cx="12192000" cy="6854652"/>
           </a:xfrm>
           <a:prstGeom prst="rect">
             <a:avLst/>
           </a:prstGeom>
         </p:spPr>
       </p:pic>
+      <p:sp>
+        <p:nvSpPr>
+          <p:cNvPr id="8" name="Content Placeholder 7"/>
+          <p:cNvSpPr>
+            <a:spLocks noGrp="1"/>
+          </p:cNvSpPr>
+          <p:nvPr>
+            <p:ph idx="1"/>
+          </p:nvPr>
+        </p:nvSpPr>
+        <p:spPr>
+          <a:xfrm>
+            <a:off x="3847545" y="2670048"/>
+            <a:ext cx="5896217" cy="3480955"/>
+          </a:xfrm>
+        </p:spPr>
+        <p:txBody>
+          <a:bodyPr/>
+          <a:lstStyle/>
+          <a:p>
+            <a:r>
+              <a:rPr lang="en-US" dirty="0" smtClean="0">
+                <a:solidFill>
+                  <a:schemeClr val="bg1"/>
+                </a:solidFill>
+              </a:rPr>
+              <a:t>As you type, the words will be automatically capitalized and lowercased.</a:t>
+            </a:r>
+            <a:endParaRPr lang="en-US" dirty="0">
+              <a:solidFill>
+                <a:schemeClr val="bg1"/>
+              </a:solidFill>
+            </a:endParaRPr>
+          </a:p>
+        </p:txBody>
+      </p:sp>
     </p:spTree>
     <p:extLst>
       <p:ext uri="{BB962C8B-B14F-4D97-AF65-F5344CB8AC3E}">
-        <p14:creationId xmlns:p14="http://schemas.microsoft.com/office/powerpoint/2010/main" val="3387606384"/>
+        <p14:creationId xmlns:p14="http://schemas.microsoft.com/office/powerpoint/2010/main" val="3761218728"/>
       </p:ext>
     </p:extLst>
   </p:cSld>
@@ -4572,45 +4614,26 @@
       </p:sp>
       <p:sp>
         <p:nvSpPr>
-          <p:cNvPr id="5" name="TextBox 4"/>
-          <p:cNvSpPr txBox="1"/>
-          <p:nvPr/>
-        </p:nvSpPr>
-        <p:spPr>
-          <a:xfrm>
-            <a:off x="3449781" y="2795154"/>
-            <a:ext cx="6691746" cy="369332"/>
-          </a:xfrm>
-          <a:prstGeom prst="rect">
-            <a:avLst/>
-          </a:prstGeom>
-          <a:noFill/>
-        </p:spPr>
-        <p:txBody>
-          <a:bodyPr wrap="square" rtlCol="0">
-            <a:spAutoFit/>
-          </a:bodyPr>
-          <a:lstStyle/>
-          <a:p>
-            <a:r>
-              <a:rPr lang="en-US" dirty="0" smtClean="0">
-                <a:solidFill>
-                  <a:schemeClr val="bg1"/>
-                </a:solidFill>
-              </a:rPr>
-              <a:t>As you type, the first letter is automatically capitalized.</a:t>
-            </a:r>
-            <a:endParaRPr lang="en-US" dirty="0">
-              <a:solidFill>
-                <a:schemeClr val="bg1"/>
-              </a:solidFill>
-            </a:endParaRPr>
+          <p:cNvPr id="3" name="Content Placeholder 2"/>
+          <p:cNvSpPr>
+            <a:spLocks noGrp="1"/>
+          </p:cNvSpPr>
+          <p:nvPr>
+            <p:ph idx="1"/>
+          </p:nvPr>
+        </p:nvSpPr>
+        <p:spPr/>
+        <p:txBody>
+          <a:bodyPr/>
+          <a:lstStyle/>
+          <a:p>
+            <a:endParaRPr lang="en-US"/>
           </a:p>
         </p:txBody>
       </p:sp>
       <p:pic>
         <p:nvPicPr>
-          <p:cNvPr id="6" name="Picture 5"/>
+          <p:cNvPr id="4" name="Picture 3"/>
           <p:cNvPicPr>
             <a:picLocks noChangeAspect="1"/>
           </p:cNvPicPr>
@@ -4631,53 +4654,17 @@
         <p:spPr>
           <a:xfrm>
             <a:off x="0" y="0"/>
-            <a:ext cx="10972800" cy="6858000"/>
+            <a:ext cx="12192000" cy="6854652"/>
           </a:xfrm>
           <a:prstGeom prst="rect">
             <a:avLst/>
           </a:prstGeom>
         </p:spPr>
       </p:pic>
-      <p:sp>
-        <p:nvSpPr>
-          <p:cNvPr id="8" name="Content Placeholder 7"/>
-          <p:cNvSpPr>
-            <a:spLocks noGrp="1"/>
-          </p:cNvSpPr>
-          <p:nvPr>
-            <p:ph idx="1"/>
-          </p:nvPr>
-        </p:nvSpPr>
-        <p:spPr>
-          <a:xfrm>
-            <a:off x="3847545" y="2670048"/>
-            <a:ext cx="5896217" cy="3480955"/>
-          </a:xfrm>
-        </p:spPr>
-        <p:txBody>
-          <a:bodyPr/>
-          <a:lstStyle/>
-          <a:p>
-            <a:r>
-              <a:rPr lang="en-US" dirty="0" smtClean="0">
-                <a:solidFill>
-                  <a:schemeClr val="bg1"/>
-                </a:solidFill>
-              </a:rPr>
-              <a:t>As you type, the words will be automatically capitalized and lowercased.</a:t>
-            </a:r>
-            <a:endParaRPr lang="en-US" dirty="0">
-              <a:solidFill>
-                <a:schemeClr val="bg1"/>
-              </a:solidFill>
-            </a:endParaRPr>
-          </a:p>
-        </p:txBody>
-      </p:sp>
     </p:spTree>
     <p:extLst>
       <p:ext uri="{BB962C8B-B14F-4D97-AF65-F5344CB8AC3E}">
-        <p14:creationId xmlns:p14="http://schemas.microsoft.com/office/powerpoint/2010/main" val="3761218728"/>
+        <p14:creationId xmlns:p14="http://schemas.microsoft.com/office/powerpoint/2010/main" val="2204715398"/>
       </p:ext>
     </p:extLst>
   </p:cSld>
@@ -4719,7 +4706,11 @@
           <a:bodyPr/>
           <a:lstStyle/>
           <a:p>
-            <a:endParaRPr lang="en-US"/>
+            <a:r>
+              <a:rPr lang="en-US" dirty="0" smtClean="0"/>
+              <a:t>Feedback</a:t>
+            </a:r>
+            <a:endParaRPr lang="en-US" dirty="0"/>
           </a:p>
         </p:txBody>
       </p:sp>
@@ -4738,122 +4729,58 @@
           <a:bodyPr/>
           <a:lstStyle/>
           <a:p>
-            <a:endParaRPr lang="en-US"/>
-          </a:p>
-        </p:txBody>
-      </p:sp>
-      <p:pic>
-        <p:nvPicPr>
-          <p:cNvPr id="4" name="Picture 3"/>
-          <p:cNvPicPr>
-            <a:picLocks noChangeAspect="1"/>
-          </p:cNvPicPr>
-          <p:nvPr/>
-        </p:nvPicPr>
-        <p:blipFill>
-          <a:blip r:embed="rId2">
-            <a:extLst>
-              <a:ext uri="{28A0092B-C50C-407E-A947-70E740481C1C}">
-                <a14:useLocalDpi xmlns:a14="http://schemas.microsoft.com/office/drawing/2010/main" val="0"/>
-              </a:ext>
-            </a:extLst>
-          </a:blip>
-          <a:stretch>
-            <a:fillRect/>
-          </a:stretch>
-        </p:blipFill>
-        <p:spPr>
-          <a:xfrm>
-            <a:off x="0" y="0"/>
-            <a:ext cx="10972800" cy="6858000"/>
-          </a:xfrm>
-          <a:prstGeom prst="rect">
-            <a:avLst/>
-          </a:prstGeom>
-        </p:spPr>
-      </p:pic>
+            <a:r>
+              <a:rPr lang="en-US" dirty="0" smtClean="0"/>
+              <a:t>We’ve tested with some people in our class. Some feedback are:</a:t>
+            </a:r>
+          </a:p>
+          <a:p>
+            <a:r>
+              <a:rPr lang="en-US" dirty="0" smtClean="0"/>
+              <a:t>Alex Marker </a:t>
+            </a:r>
+            <a:r>
+              <a:rPr lang="en-US" dirty="0" smtClean="0"/>
+              <a:t>– </a:t>
+            </a:r>
+            <a:r>
+              <a:rPr lang="en-US" altLang="zh-CN" dirty="0"/>
+              <a:t>“I mean, it wasn’t bad. There could be improvements for every everything. Time, points, no unlimited guesses. Maybe instead of waiting for the thing to buzz, you can like … you can let it be wrong. Give the right answer and give the next question. you know what I am saying?” </a:t>
+            </a:r>
+            <a:endParaRPr lang="en-US" dirty="0" smtClean="0"/>
+          </a:p>
+          <a:p>
+            <a:r>
+              <a:rPr lang="en-US" dirty="0" err="1" smtClean="0"/>
+              <a:t>Jhihyang</a:t>
+            </a:r>
+            <a:r>
+              <a:rPr lang="en-US" dirty="0" smtClean="0"/>
+              <a:t> Wu </a:t>
+            </a:r>
+            <a:r>
+              <a:rPr lang="en-US" dirty="0" smtClean="0"/>
+              <a:t>– </a:t>
+            </a:r>
+            <a:r>
+              <a:rPr lang="en-US" altLang="zh-CN" dirty="0"/>
+              <a:t>“It’s good. It’s fun. It’s educational. You guys have should add points.” </a:t>
+            </a:r>
+            <a:endParaRPr lang="en-US" dirty="0"/>
+          </a:p>
+          <a:p>
+            <a:r>
+              <a:rPr lang="en-US" dirty="0" smtClean="0"/>
+              <a:t>I think we could have added some aspects that would have made the game more fun, but overall I think that we have done a successful job on our project.</a:t>
+            </a:r>
+            <a:endParaRPr lang="en-US" dirty="0"/>
+          </a:p>
+        </p:txBody>
+      </p:sp>
     </p:spTree>
     <p:extLst>
       <p:ext uri="{BB962C8B-B14F-4D97-AF65-F5344CB8AC3E}">
-        <p14:creationId xmlns:p14="http://schemas.microsoft.com/office/powerpoint/2010/main" val="2204715398"/>
-      </p:ext>
-    </p:extLst>
-  </p:cSld>
-  <p:clrMapOvr>
-    <a:masterClrMapping/>
-  </p:clrMapOvr>
-</p:sld>
-</file>
-
-<file path=ppt/slides/slide19.xml><?xml version="1.0" encoding="utf-8"?>
-<p:sld xmlns:a="http://schemas.openxmlformats.org/drawingml/2006/main" xmlns:r="http://schemas.openxmlformats.org/officeDocument/2006/relationships" xmlns:p="http://schemas.openxmlformats.org/presentationml/2006/main">
-  <p:cSld>
-    <p:spTree>
-      <p:nvGrpSpPr>
-        <p:cNvPr id="1" name=""/>
-        <p:cNvGrpSpPr/>
-        <p:nvPr/>
-      </p:nvGrpSpPr>
-      <p:grpSpPr>
-        <a:xfrm>
-          <a:off x="0" y="0"/>
-          <a:ext cx="0" cy="0"/>
-          <a:chOff x="0" y="0"/>
-          <a:chExt cx="0" cy="0"/>
-        </a:xfrm>
-      </p:grpSpPr>
-      <p:sp>
-        <p:nvSpPr>
-          <p:cNvPr id="2" name="Title 1"/>
-          <p:cNvSpPr>
-            <a:spLocks noGrp="1"/>
-          </p:cNvSpPr>
-          <p:nvPr>
-            <p:ph type="title"/>
-          </p:nvPr>
-        </p:nvSpPr>
-        <p:spPr/>
-        <p:txBody>
-          <a:bodyPr/>
-          <a:lstStyle/>
-          <a:p>
-            <a:endParaRPr lang="en-US"/>
-          </a:p>
-        </p:txBody>
-      </p:sp>
-      <p:pic>
-        <p:nvPicPr>
-          <p:cNvPr id="4" name="Content Placeholder 3"/>
-          <p:cNvPicPr>
-            <a:picLocks noGrp="1" noChangeAspect="1"/>
-          </p:cNvPicPr>
-          <p:nvPr>
-            <p:ph idx="1"/>
-          </p:nvPr>
-        </p:nvPicPr>
-        <p:blipFill>
-          <a:blip r:embed="rId2">
-            <a:extLst>
-              <a:ext uri="{28A0092B-C50C-407E-A947-70E740481C1C}">
-                <a14:useLocalDpi xmlns:a14="http://schemas.microsoft.com/office/drawing/2010/main" val="0"/>
-              </a:ext>
-            </a:extLst>
-          </a:blip>
-          <a:stretch>
-            <a:fillRect/>
-          </a:stretch>
-        </p:blipFill>
-        <p:spPr>
-          <a:xfrm>
-            <a:off x="0" y="0"/>
-            <a:ext cx="11159836" cy="6974898"/>
-          </a:xfrm>
-        </p:spPr>
-      </p:pic>
-    </p:spTree>
-    <p:extLst>
-      <p:ext uri="{BB962C8B-B14F-4D97-AF65-F5344CB8AC3E}">
-        <p14:creationId xmlns:p14="http://schemas.microsoft.com/office/powerpoint/2010/main" val="2805537524"/>
+        <p14:creationId xmlns:p14="http://schemas.microsoft.com/office/powerpoint/2010/main" val="697432138"/>
       </p:ext>
     </p:extLst>
   </p:cSld>
@@ -4922,11 +4849,7 @@
           <a:p>
             <a:r>
               <a:rPr lang="en-US" sz="2400" dirty="0" smtClean="0"/>
-              <a:t>Our project is coded in Python, because we saw that using Python would give us a lot of flexibility and freedom. We are making a project that helps kids learn basic vocabulary, times table, and the correlation between flags and their respective </a:t>
-            </a:r>
-            <a:r>
-              <a:rPr lang="en-US" sz="2400" dirty="0" smtClean="0"/>
-              <a:t>countries. We picked these three subjects because we feel as if these topics were the most necessary skills that children need to know. </a:t>
+              <a:t>Our project is coded in Python, because we saw that using Python would give us a lot of flexibility and freedom. We are making a project that helps kids learn basic vocabulary, times table, and the correlation between flags and their respective countries. We picked these three subjects because we feel as if these topics were the most necessary skills that children need to know. </a:t>
             </a:r>
             <a:endParaRPr lang="en-US" sz="2400" dirty="0"/>
           </a:p>
@@ -4936,107 +4859,6 @@
     <p:extLst>
       <p:ext uri="{BB962C8B-B14F-4D97-AF65-F5344CB8AC3E}">
         <p14:creationId xmlns:p14="http://schemas.microsoft.com/office/powerpoint/2010/main" val="156403675"/>
-      </p:ext>
-    </p:extLst>
-  </p:cSld>
-  <p:clrMapOvr>
-    <a:masterClrMapping/>
-  </p:clrMapOvr>
-</p:sld>
-</file>
-
-<file path=ppt/slides/slide20.xml><?xml version="1.0" encoding="utf-8"?>
-<p:sld xmlns:a="http://schemas.openxmlformats.org/drawingml/2006/main" xmlns:r="http://schemas.openxmlformats.org/officeDocument/2006/relationships" xmlns:p="http://schemas.openxmlformats.org/presentationml/2006/main">
-  <p:cSld>
-    <p:spTree>
-      <p:nvGrpSpPr>
-        <p:cNvPr id="1" name=""/>
-        <p:cNvGrpSpPr/>
-        <p:nvPr/>
-      </p:nvGrpSpPr>
-      <p:grpSpPr>
-        <a:xfrm>
-          <a:off x="0" y="0"/>
-          <a:ext cx="0" cy="0"/>
-          <a:chOff x="0" y="0"/>
-          <a:chExt cx="0" cy="0"/>
-        </a:xfrm>
-      </p:grpSpPr>
-      <p:sp>
-        <p:nvSpPr>
-          <p:cNvPr id="2" name="Title 1"/>
-          <p:cNvSpPr>
-            <a:spLocks noGrp="1"/>
-          </p:cNvSpPr>
-          <p:nvPr>
-            <p:ph type="title"/>
-          </p:nvPr>
-        </p:nvSpPr>
-        <p:spPr/>
-        <p:txBody>
-          <a:bodyPr/>
-          <a:lstStyle/>
-          <a:p>
-            <a:r>
-              <a:rPr lang="en-US" dirty="0" smtClean="0"/>
-              <a:t>Feedback</a:t>
-            </a:r>
-            <a:endParaRPr lang="en-US" dirty="0"/>
-          </a:p>
-        </p:txBody>
-      </p:sp>
-      <p:sp>
-        <p:nvSpPr>
-          <p:cNvPr id="3" name="Content Placeholder 2"/>
-          <p:cNvSpPr>
-            <a:spLocks noGrp="1"/>
-          </p:cNvSpPr>
-          <p:nvPr>
-            <p:ph idx="1"/>
-          </p:nvPr>
-        </p:nvSpPr>
-        <p:spPr/>
-        <p:txBody>
-          <a:bodyPr/>
-          <a:lstStyle/>
-          <a:p>
-            <a:r>
-              <a:rPr lang="en-US" dirty="0" smtClean="0"/>
-              <a:t>We’ve tested with some people in our class. Some feedback are:</a:t>
-            </a:r>
-          </a:p>
-          <a:p>
-            <a:r>
-              <a:rPr lang="en-US" dirty="0" smtClean="0"/>
-              <a:t>Alex – you guys should make a score and a timer.</a:t>
-            </a:r>
-          </a:p>
-          <a:p>
-            <a:r>
-              <a:rPr lang="en-US" dirty="0" err="1" smtClean="0"/>
-              <a:t>Jhihyang</a:t>
-            </a:r>
-            <a:r>
-              <a:rPr lang="en-US" dirty="0" smtClean="0"/>
-              <a:t> – add timer. It’s good overall.</a:t>
-            </a:r>
-          </a:p>
-          <a:p>
-            <a:endParaRPr lang="en-US" dirty="0"/>
-          </a:p>
-          <a:p>
-            <a:r>
-              <a:rPr lang="en-US" dirty="0" smtClean="0"/>
-              <a:t>I think we could have added some aspects that would have made the game more fun, but overall I think that we have done a successful job on our project.</a:t>
-            </a:r>
-            <a:endParaRPr lang="en-US" dirty="0"/>
-          </a:p>
-        </p:txBody>
-      </p:sp>
-    </p:spTree>
-    <p:extLst>
-      <p:ext uri="{BB962C8B-B14F-4D97-AF65-F5344CB8AC3E}">
-        <p14:creationId xmlns:p14="http://schemas.microsoft.com/office/powerpoint/2010/main" val="697432138"/>
       </p:ext>
     </p:extLst>
   </p:cSld>
@@ -5105,15 +4927,7 @@
           <a:p>
             <a:r>
               <a:rPr lang="en-US" sz="2800" dirty="0" smtClean="0"/>
-              <a:t>We aim to help kids become more educated through teaching them the basic knowledge. This will help kids not only study better, they will become more educated in general</a:t>
-            </a:r>
-            <a:r>
-              <a:rPr lang="en-US" sz="2800" dirty="0" smtClean="0"/>
-              <a:t>. The problem addressed is this: when kids do not have a fundamental </a:t>
-            </a:r>
-            <a:r>
-              <a:rPr lang="en-US" sz="2800" dirty="0" smtClean="0"/>
-              <a:t>understanding of basic material, they cannot efficiently learn in school. Therefore, our project aims to make kids smarter through rote repetition.</a:t>
+              <a:t>We aim to help kids become more educated through teaching them the basic knowledge. This will help kids not only study better, they will become more educated in general. The problem addressed is this: when kids do not have a fundamental understanding of basic material, they cannot efficiently learn in school. Therefore, our project aims to make kids smarter through rote repetition.</a:t>
             </a:r>
             <a:endParaRPr lang="en-US" sz="2800" dirty="0"/>
           </a:p>

</xml_diff>